<commit_message>
first draft of css
</commit_message>
<xml_diff>
--- a/maquette.pptx
+++ b/maquette.pptx
@@ -104,7 +104,49 @@
       </a:defRPr>
     </a:lvl9pPr>
   </p:defaultTextStyle>
+  <p:extLst>
+    <p:ext uri="{EFAFB233-063F-42B5-8137-9DF3F51BA10A}">
+      <p15:sldGuideLst xmlns:p15="http://schemas.microsoft.com/office/powerpoint/2012/main"/>
+    </p:ext>
+  </p:extLst>
 </p:presentation>
+</file>
+
+<file path=ppt/changesInfos/changesInfo1.xml><?xml version="1.0" encoding="utf-8"?>
+<pc:chgInfo xmlns:a="http://schemas.openxmlformats.org/drawingml/2006/main" xmlns:r="http://schemas.openxmlformats.org/officeDocument/2006/relationships" xmlns:ac="http://schemas.microsoft.com/office/drawing/2013/main/command" xmlns:pc="http://schemas.microsoft.com/office/powerpoint/2013/main/command">
+  <pc:docChgLst>
+    <pc:chgData name="Fabrice Pestel" userId="cd3130c1f59029cf" providerId="LiveId" clId="{23ED2170-82A5-4620-BF0F-89B57C48E960}"/>
+    <pc:docChg chg="undo custSel modSld">
+      <pc:chgData name="Fabrice Pestel" userId="cd3130c1f59029cf" providerId="LiveId" clId="{23ED2170-82A5-4620-BF0F-89B57C48E960}" dt="2021-03-06T18:19:03.485" v="33" actId="20577"/>
+      <pc:docMkLst>
+        <pc:docMk/>
+      </pc:docMkLst>
+      <pc:sldChg chg="modSp mod">
+        <pc:chgData name="Fabrice Pestel" userId="cd3130c1f59029cf" providerId="LiveId" clId="{23ED2170-82A5-4620-BF0F-89B57C48E960}" dt="2021-03-06T18:19:03.485" v="33" actId="20577"/>
+        <pc:sldMkLst>
+          <pc:docMk/>
+          <pc:sldMk cId="3917275153" sldId="256"/>
+        </pc:sldMkLst>
+        <pc:spChg chg="mod">
+          <ac:chgData name="Fabrice Pestel" userId="cd3130c1f59029cf" providerId="LiveId" clId="{23ED2170-82A5-4620-BF0F-89B57C48E960}" dt="2021-03-06T07:26:59.440" v="25" actId="20577"/>
+          <ac:spMkLst>
+            <pc:docMk/>
+            <pc:sldMk cId="3917275153" sldId="256"/>
+            <ac:spMk id="2" creationId="{428903ED-94FB-4AAB-9582-269388E784AD}"/>
+          </ac:spMkLst>
+        </pc:spChg>
+        <pc:spChg chg="mod">
+          <ac:chgData name="Fabrice Pestel" userId="cd3130c1f59029cf" providerId="LiveId" clId="{23ED2170-82A5-4620-BF0F-89B57C48E960}" dt="2021-03-06T18:19:03.485" v="33" actId="20577"/>
+          <ac:spMkLst>
+            <pc:docMk/>
+            <pc:sldMk cId="3917275153" sldId="256"/>
+            <ac:spMk id="14" creationId="{A3E61F0D-CB53-43B4-97ED-5DACD7BB1531}"/>
+          </ac:spMkLst>
+        </pc:spChg>
+      </pc:sldChg>
+    </pc:docChg>
+  </pc:docChgLst>
+</pc:chgInfo>
 </file>
 
 <file path=ppt/slideLayouts/slideLayout1.xml><?xml version="1.0" encoding="utf-8"?>
@@ -238,7 +280,7 @@
           <a:p>
             <a:fld id="{99051032-7637-48FE-AC7D-486E690C31D3}" type="datetimeFigureOut">
               <a:rPr lang="en-BE" smtClean="0"/>
-              <a:t>04/03/2021</a:t>
+              <a:t>06/03/2021</a:t>
             </a:fld>
             <a:endParaRPr lang="en-BE"/>
           </a:p>
@@ -408,7 +450,7 @@
           <a:p>
             <a:fld id="{99051032-7637-48FE-AC7D-486E690C31D3}" type="datetimeFigureOut">
               <a:rPr lang="en-BE" smtClean="0"/>
-              <a:t>04/03/2021</a:t>
+              <a:t>06/03/2021</a:t>
             </a:fld>
             <a:endParaRPr lang="en-BE"/>
           </a:p>
@@ -588,7 +630,7 @@
           <a:p>
             <a:fld id="{99051032-7637-48FE-AC7D-486E690C31D3}" type="datetimeFigureOut">
               <a:rPr lang="en-BE" smtClean="0"/>
-              <a:t>04/03/2021</a:t>
+              <a:t>06/03/2021</a:t>
             </a:fld>
             <a:endParaRPr lang="en-BE"/>
           </a:p>
@@ -758,7 +800,7 @@
           <a:p>
             <a:fld id="{99051032-7637-48FE-AC7D-486E690C31D3}" type="datetimeFigureOut">
               <a:rPr lang="en-BE" smtClean="0"/>
-              <a:t>04/03/2021</a:t>
+              <a:t>06/03/2021</a:t>
             </a:fld>
             <a:endParaRPr lang="en-BE"/>
           </a:p>
@@ -1002,7 +1044,7 @@
           <a:p>
             <a:fld id="{99051032-7637-48FE-AC7D-486E690C31D3}" type="datetimeFigureOut">
               <a:rPr lang="en-BE" smtClean="0"/>
-              <a:t>04/03/2021</a:t>
+              <a:t>06/03/2021</a:t>
             </a:fld>
             <a:endParaRPr lang="en-BE"/>
           </a:p>
@@ -1234,7 +1276,7 @@
           <a:p>
             <a:fld id="{99051032-7637-48FE-AC7D-486E690C31D3}" type="datetimeFigureOut">
               <a:rPr lang="en-BE" smtClean="0"/>
-              <a:t>04/03/2021</a:t>
+              <a:t>06/03/2021</a:t>
             </a:fld>
             <a:endParaRPr lang="en-BE"/>
           </a:p>
@@ -1601,7 +1643,7 @@
           <a:p>
             <a:fld id="{99051032-7637-48FE-AC7D-486E690C31D3}" type="datetimeFigureOut">
               <a:rPr lang="en-BE" smtClean="0"/>
-              <a:t>04/03/2021</a:t>
+              <a:t>06/03/2021</a:t>
             </a:fld>
             <a:endParaRPr lang="en-BE"/>
           </a:p>
@@ -1719,7 +1761,7 @@
           <a:p>
             <a:fld id="{99051032-7637-48FE-AC7D-486E690C31D3}" type="datetimeFigureOut">
               <a:rPr lang="en-BE" smtClean="0"/>
-              <a:t>04/03/2021</a:t>
+              <a:t>06/03/2021</a:t>
             </a:fld>
             <a:endParaRPr lang="en-BE"/>
           </a:p>
@@ -1814,7 +1856,7 @@
           <a:p>
             <a:fld id="{99051032-7637-48FE-AC7D-486E690C31D3}" type="datetimeFigureOut">
               <a:rPr lang="en-BE" smtClean="0"/>
-              <a:t>04/03/2021</a:t>
+              <a:t>06/03/2021</a:t>
             </a:fld>
             <a:endParaRPr lang="en-BE"/>
           </a:p>
@@ -2091,7 +2133,7 @@
           <a:p>
             <a:fld id="{99051032-7637-48FE-AC7D-486E690C31D3}" type="datetimeFigureOut">
               <a:rPr lang="en-BE" smtClean="0"/>
-              <a:t>04/03/2021</a:t>
+              <a:t>06/03/2021</a:t>
             </a:fld>
             <a:endParaRPr lang="en-BE"/>
           </a:p>
@@ -2348,7 +2390,7 @@
           <a:p>
             <a:fld id="{99051032-7637-48FE-AC7D-486E690C31D3}" type="datetimeFigureOut">
               <a:rPr lang="en-BE" smtClean="0"/>
-              <a:t>04/03/2021</a:t>
+              <a:t>06/03/2021</a:t>
             </a:fld>
             <a:endParaRPr lang="en-BE"/>
           </a:p>
@@ -2561,7 +2603,7 @@
           <a:p>
             <a:fld id="{99051032-7637-48FE-AC7D-486E690C31D3}" type="datetimeFigureOut">
               <a:rPr lang="en-BE" smtClean="0"/>
-              <a:t>04/03/2021</a:t>
+              <a:t>06/03/2021</a:t>
             </a:fld>
             <a:endParaRPr lang="en-BE"/>
           </a:p>
@@ -2987,7 +3029,7 @@
           <a:bodyPr/>
           <a:lstStyle/>
           <a:p>
-            <a:endParaRPr lang="en-BE"/>
+            <a:endParaRPr lang="en-BE" dirty="0"/>
           </a:p>
         </p:txBody>
       </p:sp>
@@ -3274,7 +3316,7 @@
           <a:p>
             <a:r>
               <a:rPr lang="fr-FR" sz="1100" dirty="0"/>
-              <a:t>&lt;body&gt;</a:t>
+              <a:t>&lt;main&gt;</a:t>
             </a:r>
             <a:endParaRPr lang="en-BE" sz="1100" dirty="0"/>
           </a:p>

</xml_diff>

<commit_message>
modidication html and revision css
</commit_message>
<xml_diff>
--- a/maquette.pptx
+++ b/maquette.pptx
@@ -117,12 +117,12 @@
   <pc:docChgLst>
     <pc:chgData name="Fabrice Pestel" userId="cd3130c1f59029cf" providerId="LiveId" clId="{23ED2170-82A5-4620-BF0F-89B57C48E960}"/>
     <pc:docChg chg="undo custSel modSld">
-      <pc:chgData name="Fabrice Pestel" userId="cd3130c1f59029cf" providerId="LiveId" clId="{23ED2170-82A5-4620-BF0F-89B57C48E960}" dt="2021-03-06T18:19:03.485" v="33" actId="20577"/>
+      <pc:chgData name="Fabrice Pestel" userId="cd3130c1f59029cf" providerId="LiveId" clId="{23ED2170-82A5-4620-BF0F-89B57C48E960}" dt="2021-04-05T13:22:16.688" v="124" actId="20577"/>
       <pc:docMkLst>
         <pc:docMk/>
       </pc:docMkLst>
-      <pc:sldChg chg="modSp mod">
-        <pc:chgData name="Fabrice Pestel" userId="cd3130c1f59029cf" providerId="LiveId" clId="{23ED2170-82A5-4620-BF0F-89B57C48E960}" dt="2021-03-06T18:19:03.485" v="33" actId="20577"/>
+      <pc:sldChg chg="addSp modSp mod">
+        <pc:chgData name="Fabrice Pestel" userId="cd3130c1f59029cf" providerId="LiveId" clId="{23ED2170-82A5-4620-BF0F-89B57C48E960}" dt="2021-04-05T13:22:16.688" v="124" actId="20577"/>
         <pc:sldMkLst>
           <pc:docMk/>
           <pc:sldMk cId="3917275153" sldId="256"/>
@@ -135,12 +135,132 @@
             <ac:spMk id="2" creationId="{428903ED-94FB-4AAB-9582-269388E784AD}"/>
           </ac:spMkLst>
         </pc:spChg>
+        <pc:spChg chg="add mod">
+          <ac:chgData name="Fabrice Pestel" userId="cd3130c1f59029cf" providerId="LiveId" clId="{23ED2170-82A5-4620-BF0F-89B57C48E960}" dt="2021-04-05T07:32:05.764" v="109" actId="208"/>
+          <ac:spMkLst>
+            <pc:docMk/>
+            <pc:sldMk cId="3917275153" sldId="256"/>
+            <ac:spMk id="4" creationId="{1C2C0D0A-EB27-4048-9E16-E8117BA65326}"/>
+          </ac:spMkLst>
+        </pc:spChg>
         <pc:spChg chg="mod">
           <ac:chgData name="Fabrice Pestel" userId="cd3130c1f59029cf" providerId="LiveId" clId="{23ED2170-82A5-4620-BF0F-89B57C48E960}" dt="2021-03-06T18:19:03.485" v="33" actId="20577"/>
           <ac:spMkLst>
             <pc:docMk/>
             <pc:sldMk cId="3917275153" sldId="256"/>
             <ac:spMk id="14" creationId="{A3E61F0D-CB53-43B4-97ED-5DACD7BB1531}"/>
+          </ac:spMkLst>
+        </pc:spChg>
+        <pc:spChg chg="mod">
+          <ac:chgData name="Fabrice Pestel" userId="cd3130c1f59029cf" providerId="LiveId" clId="{23ED2170-82A5-4620-BF0F-89B57C48E960}" dt="2021-04-05T07:28:00.942" v="87" actId="14100"/>
+          <ac:spMkLst>
+            <pc:docMk/>
+            <pc:sldMk cId="3917275153" sldId="256"/>
+            <ac:spMk id="18" creationId="{216E5290-266F-442A-973F-4217F3236260}"/>
+          </ac:spMkLst>
+        </pc:spChg>
+        <pc:spChg chg="mod">
+          <ac:chgData name="Fabrice Pestel" userId="cd3130c1f59029cf" providerId="LiveId" clId="{23ED2170-82A5-4620-BF0F-89B57C48E960}" dt="2021-04-05T07:28:08.067" v="88" actId="14100"/>
+          <ac:spMkLst>
+            <pc:docMk/>
+            <pc:sldMk cId="3917275153" sldId="256"/>
+            <ac:spMk id="19" creationId="{A7100B20-BCA1-4564-A677-A5A782934581}"/>
+          </ac:spMkLst>
+        </pc:spChg>
+        <pc:spChg chg="mod">
+          <ac:chgData name="Fabrice Pestel" userId="cd3130c1f59029cf" providerId="LiveId" clId="{23ED2170-82A5-4620-BF0F-89B57C48E960}" dt="2021-04-05T07:24:32.676" v="54" actId="20577"/>
+          <ac:spMkLst>
+            <pc:docMk/>
+            <pc:sldMk cId="3917275153" sldId="256"/>
+            <ac:spMk id="24" creationId="{F6DE365D-A3E5-4D3E-A549-8C97A2A36090}"/>
+          </ac:spMkLst>
+        </pc:spChg>
+        <pc:spChg chg="mod">
+          <ac:chgData name="Fabrice Pestel" userId="cd3130c1f59029cf" providerId="LiveId" clId="{23ED2170-82A5-4620-BF0F-89B57C48E960}" dt="2021-04-05T07:28:16.573" v="89" actId="1076"/>
+          <ac:spMkLst>
+            <pc:docMk/>
+            <pc:sldMk cId="3917275153" sldId="256"/>
+            <ac:spMk id="28" creationId="{2DDAD2C5-0556-40C8-80B2-8D606D04506F}"/>
+          </ac:spMkLst>
+        </pc:spChg>
+        <pc:spChg chg="mod">
+          <ac:chgData name="Fabrice Pestel" userId="cd3130c1f59029cf" providerId="LiveId" clId="{23ED2170-82A5-4620-BF0F-89B57C48E960}" dt="2021-04-05T07:29:28.820" v="90" actId="14100"/>
+          <ac:spMkLst>
+            <pc:docMk/>
+            <pc:sldMk cId="3917275153" sldId="256"/>
+            <ac:spMk id="41" creationId="{8F4B9ABD-A807-42A8-AC44-64AB562EDE00}"/>
+          </ac:spMkLst>
+        </pc:spChg>
+        <pc:spChg chg="mod">
+          <ac:chgData name="Fabrice Pestel" userId="cd3130c1f59029cf" providerId="LiveId" clId="{23ED2170-82A5-4620-BF0F-89B57C48E960}" dt="2021-04-05T07:25:07.199" v="84" actId="20577"/>
+          <ac:spMkLst>
+            <pc:docMk/>
+            <pc:sldMk cId="3917275153" sldId="256"/>
+            <ac:spMk id="53" creationId="{E15A3429-E91C-4499-AD4C-B7C7C116661C}"/>
+          </ac:spMkLst>
+        </pc:spChg>
+        <pc:spChg chg="mod">
+          <ac:chgData name="Fabrice Pestel" userId="cd3130c1f59029cf" providerId="LiveId" clId="{23ED2170-82A5-4620-BF0F-89B57C48E960}" dt="2021-04-05T07:32:32.135" v="111" actId="20577"/>
+          <ac:spMkLst>
+            <pc:docMk/>
+            <pc:sldMk cId="3917275153" sldId="256"/>
+            <ac:spMk id="60" creationId="{A0C9922B-66B4-444C-9939-3C9C726A5660}"/>
+          </ac:spMkLst>
+        </pc:spChg>
+        <pc:spChg chg="mod">
+          <ac:chgData name="Fabrice Pestel" userId="cd3130c1f59029cf" providerId="LiveId" clId="{23ED2170-82A5-4620-BF0F-89B57C48E960}" dt="2021-04-05T13:22:16.688" v="124" actId="20577"/>
+          <ac:spMkLst>
+            <pc:docMk/>
+            <pc:sldMk cId="3917275153" sldId="256"/>
+            <ac:spMk id="61" creationId="{11FDBBE8-D944-40E6-9145-63281DB7DABF}"/>
+          </ac:spMkLst>
+        </pc:spChg>
+        <pc:spChg chg="mod">
+          <ac:chgData name="Fabrice Pestel" userId="cd3130c1f59029cf" providerId="LiveId" clId="{23ED2170-82A5-4620-BF0F-89B57C48E960}" dt="2021-04-05T07:30:56.197" v="98" actId="14100"/>
+          <ac:spMkLst>
+            <pc:docMk/>
+            <pc:sldMk cId="3917275153" sldId="256"/>
+            <ac:spMk id="71" creationId="{1D4695D6-93A1-4DDA-BC81-96C865E11A12}"/>
+          </ac:spMkLst>
+        </pc:spChg>
+        <pc:spChg chg="mod">
+          <ac:chgData name="Fabrice Pestel" userId="cd3130c1f59029cf" providerId="LiveId" clId="{23ED2170-82A5-4620-BF0F-89B57C48E960}" dt="2021-04-05T07:31:04.574" v="100" actId="14100"/>
+          <ac:spMkLst>
+            <pc:docMk/>
+            <pc:sldMk cId="3917275153" sldId="256"/>
+            <ac:spMk id="72" creationId="{674AD395-7E8F-4C1F-89D8-740F91E346DF}"/>
+          </ac:spMkLst>
+        </pc:spChg>
+        <pc:spChg chg="mod">
+          <ac:chgData name="Fabrice Pestel" userId="cd3130c1f59029cf" providerId="LiveId" clId="{23ED2170-82A5-4620-BF0F-89B57C48E960}" dt="2021-04-05T07:31:08.734" v="101" actId="14100"/>
+          <ac:spMkLst>
+            <pc:docMk/>
+            <pc:sldMk cId="3917275153" sldId="256"/>
+            <ac:spMk id="73" creationId="{908ACD6E-5114-40AE-8143-2B3276D44161}"/>
+          </ac:spMkLst>
+        </pc:spChg>
+        <pc:spChg chg="mod">
+          <ac:chgData name="Fabrice Pestel" userId="cd3130c1f59029cf" providerId="LiveId" clId="{23ED2170-82A5-4620-BF0F-89B57C48E960}" dt="2021-04-05T07:31:32.254" v="106" actId="14100"/>
+          <ac:spMkLst>
+            <pc:docMk/>
+            <pc:sldMk cId="3917275153" sldId="256"/>
+            <ac:spMk id="74" creationId="{66360CD8-4086-4169-AEE8-D48A4C54EFAD}"/>
+          </ac:spMkLst>
+        </pc:spChg>
+        <pc:spChg chg="mod">
+          <ac:chgData name="Fabrice Pestel" userId="cd3130c1f59029cf" providerId="LiveId" clId="{23ED2170-82A5-4620-BF0F-89B57C48E960}" dt="2021-04-05T07:31:28.760" v="105" actId="14100"/>
+          <ac:spMkLst>
+            <pc:docMk/>
+            <pc:sldMk cId="3917275153" sldId="256"/>
+            <ac:spMk id="75" creationId="{3596288D-B5AC-4F84-B7E0-A87130C6B19A}"/>
+          </ac:spMkLst>
+        </pc:spChg>
+        <pc:spChg chg="mod">
+          <ac:chgData name="Fabrice Pestel" userId="cd3130c1f59029cf" providerId="LiveId" clId="{23ED2170-82A5-4620-BF0F-89B57C48E960}" dt="2021-04-05T07:31:18.407" v="103" actId="14100"/>
+          <ac:spMkLst>
+            <pc:docMk/>
+            <pc:sldMk cId="3917275153" sldId="256"/>
+            <ac:spMk id="76" creationId="{019EF918-2ED2-4CAE-8B8E-488C9DBF80E4}"/>
           </ac:spMkLst>
         </pc:spChg>
       </pc:sldChg>
@@ -280,7 +400,7 @@
           <a:p>
             <a:fld id="{99051032-7637-48FE-AC7D-486E690C31D3}" type="datetimeFigureOut">
               <a:rPr lang="en-BE" smtClean="0"/>
-              <a:t>06/03/2021</a:t>
+              <a:t>05/04/2021</a:t>
             </a:fld>
             <a:endParaRPr lang="en-BE"/>
           </a:p>
@@ -450,7 +570,7 @@
           <a:p>
             <a:fld id="{99051032-7637-48FE-AC7D-486E690C31D3}" type="datetimeFigureOut">
               <a:rPr lang="en-BE" smtClean="0"/>
-              <a:t>06/03/2021</a:t>
+              <a:t>05/04/2021</a:t>
             </a:fld>
             <a:endParaRPr lang="en-BE"/>
           </a:p>
@@ -630,7 +750,7 @@
           <a:p>
             <a:fld id="{99051032-7637-48FE-AC7D-486E690C31D3}" type="datetimeFigureOut">
               <a:rPr lang="en-BE" smtClean="0"/>
-              <a:t>06/03/2021</a:t>
+              <a:t>05/04/2021</a:t>
             </a:fld>
             <a:endParaRPr lang="en-BE"/>
           </a:p>
@@ -800,7 +920,7 @@
           <a:p>
             <a:fld id="{99051032-7637-48FE-AC7D-486E690C31D3}" type="datetimeFigureOut">
               <a:rPr lang="en-BE" smtClean="0"/>
-              <a:t>06/03/2021</a:t>
+              <a:t>05/04/2021</a:t>
             </a:fld>
             <a:endParaRPr lang="en-BE"/>
           </a:p>
@@ -1044,7 +1164,7 @@
           <a:p>
             <a:fld id="{99051032-7637-48FE-AC7D-486E690C31D3}" type="datetimeFigureOut">
               <a:rPr lang="en-BE" smtClean="0"/>
-              <a:t>06/03/2021</a:t>
+              <a:t>05/04/2021</a:t>
             </a:fld>
             <a:endParaRPr lang="en-BE"/>
           </a:p>
@@ -1276,7 +1396,7 @@
           <a:p>
             <a:fld id="{99051032-7637-48FE-AC7D-486E690C31D3}" type="datetimeFigureOut">
               <a:rPr lang="en-BE" smtClean="0"/>
-              <a:t>06/03/2021</a:t>
+              <a:t>05/04/2021</a:t>
             </a:fld>
             <a:endParaRPr lang="en-BE"/>
           </a:p>
@@ -1643,7 +1763,7 @@
           <a:p>
             <a:fld id="{99051032-7637-48FE-AC7D-486E690C31D3}" type="datetimeFigureOut">
               <a:rPr lang="en-BE" smtClean="0"/>
-              <a:t>06/03/2021</a:t>
+              <a:t>05/04/2021</a:t>
             </a:fld>
             <a:endParaRPr lang="en-BE"/>
           </a:p>
@@ -1761,7 +1881,7 @@
           <a:p>
             <a:fld id="{99051032-7637-48FE-AC7D-486E690C31D3}" type="datetimeFigureOut">
               <a:rPr lang="en-BE" smtClean="0"/>
-              <a:t>06/03/2021</a:t>
+              <a:t>05/04/2021</a:t>
             </a:fld>
             <a:endParaRPr lang="en-BE"/>
           </a:p>
@@ -1856,7 +1976,7 @@
           <a:p>
             <a:fld id="{99051032-7637-48FE-AC7D-486E690C31D3}" type="datetimeFigureOut">
               <a:rPr lang="en-BE" smtClean="0"/>
-              <a:t>06/03/2021</a:t>
+              <a:t>05/04/2021</a:t>
             </a:fld>
             <a:endParaRPr lang="en-BE"/>
           </a:p>
@@ -2133,7 +2253,7 @@
           <a:p>
             <a:fld id="{99051032-7637-48FE-AC7D-486E690C31D3}" type="datetimeFigureOut">
               <a:rPr lang="en-BE" smtClean="0"/>
-              <a:t>06/03/2021</a:t>
+              <a:t>05/04/2021</a:t>
             </a:fld>
             <a:endParaRPr lang="en-BE"/>
           </a:p>
@@ -2390,7 +2510,7 @@
           <a:p>
             <a:fld id="{99051032-7637-48FE-AC7D-486E690C31D3}" type="datetimeFigureOut">
               <a:rPr lang="en-BE" smtClean="0"/>
-              <a:t>06/03/2021</a:t>
+              <a:t>05/04/2021</a:t>
             </a:fld>
             <a:endParaRPr lang="en-BE"/>
           </a:p>
@@ -2603,7 +2723,7 @@
           <a:p>
             <a:fld id="{99051032-7637-48FE-AC7D-486E690C31D3}" type="datetimeFigureOut">
               <a:rPr lang="en-BE" smtClean="0"/>
-              <a:t>06/03/2021</a:t>
+              <a:t>05/04/2021</a:t>
             </a:fld>
             <a:endParaRPr lang="en-BE"/>
           </a:p>
@@ -3491,8 +3611,8 @@
         </p:nvSpPr>
         <p:spPr>
           <a:xfrm>
-            <a:off x="39329" y="2561610"/>
-            <a:ext cx="6248400" cy="689260"/>
+            <a:off x="39329" y="2561609"/>
+            <a:ext cx="6248400" cy="947197"/>
           </a:xfrm>
           <a:prstGeom prst="rect">
             <a:avLst/>
@@ -3543,8 +3663,8 @@
         </p:nvSpPr>
         <p:spPr>
           <a:xfrm>
-            <a:off x="39329" y="3298492"/>
-            <a:ext cx="6774426" cy="3436605"/>
+            <a:off x="39329" y="3542873"/>
+            <a:ext cx="6774426" cy="3192224"/>
           </a:xfrm>
           <a:prstGeom prst="rect">
             <a:avLst/>
@@ -3804,7 +3924,7 @@
         <p:spPr>
           <a:xfrm>
             <a:off x="2641963" y="1585691"/>
-            <a:ext cx="1003801" cy="261610"/>
+            <a:ext cx="790601" cy="261610"/>
           </a:xfrm>
           <a:prstGeom prst="rect">
             <a:avLst/>
@@ -3823,7 +3943,23 @@
                   <a:srgbClr val="FF0000"/>
                 </a:solidFill>
               </a:rPr>
-              <a:t>&lt;div #header&gt;</a:t>
+              <a:t>&lt;div .</a:t>
+            </a:r>
+            <a:r>
+              <a:rPr lang="fr-FR" sz="1100" dirty="0" err="1">
+                <a:solidFill>
+                  <a:srgbClr val="FF0000"/>
+                </a:solidFill>
+              </a:rPr>
+              <a:t>title</a:t>
+            </a:r>
+            <a:r>
+              <a:rPr lang="fr-FR" sz="1100" dirty="0">
+                <a:solidFill>
+                  <a:srgbClr val="FF0000"/>
+                </a:solidFill>
+              </a:rPr>
+              <a:t>&gt;</a:t>
             </a:r>
             <a:endParaRPr lang="en-BE" sz="1100" dirty="0">
               <a:solidFill>
@@ -3951,8 +4087,8 @@
         </p:nvSpPr>
         <p:spPr>
           <a:xfrm>
-            <a:off x="5659917" y="3289743"/>
-            <a:ext cx="1220206" cy="261610"/>
+            <a:off x="5264548" y="3459409"/>
+            <a:ext cx="1665841" cy="261610"/>
           </a:xfrm>
           <a:prstGeom prst="rect">
             <a:avLst/>
@@ -3971,7 +4107,7 @@
                   <a:srgbClr val="FF0000"/>
                 </a:solidFill>
               </a:rPr>
-              <a:t>&lt;section #results&gt;</a:t>
+              <a:t>&lt;section #search_results&gt;</a:t>
             </a:r>
             <a:endParaRPr lang="en-BE" sz="1100" dirty="0">
               <a:solidFill>
@@ -4431,8 +4567,8 @@
         </p:nvSpPr>
         <p:spPr>
           <a:xfrm>
-            <a:off x="101408" y="3355428"/>
-            <a:ext cx="3133111" cy="218560"/>
+            <a:off x="101408" y="3263476"/>
+            <a:ext cx="3133111" cy="236635"/>
           </a:xfrm>
           <a:prstGeom prst="rect">
             <a:avLst/>
@@ -5048,7 +5184,7 @@
         <p:spPr>
           <a:xfrm>
             <a:off x="2828018" y="2017307"/>
-            <a:ext cx="801823" cy="261610"/>
+            <a:ext cx="1449436" cy="261610"/>
           </a:xfrm>
           <a:prstGeom prst="rect">
             <a:avLst/>
@@ -5067,7 +5203,23 @@
                   <a:schemeClr val="accent1"/>
                 </a:solidFill>
               </a:rPr>
-              <a:t>&lt;h1 #title&gt;</a:t>
+              <a:t>&lt;h1 .</a:t>
+            </a:r>
+            <a:r>
+              <a:rPr lang="fr-FR" sz="1100" dirty="0" err="1">
+                <a:solidFill>
+                  <a:schemeClr val="accent1"/>
+                </a:solidFill>
+              </a:rPr>
+              <a:t>title</a:t>
+            </a:r>
+            <a:r>
+              <a:rPr lang="fr-FR" sz="1100" dirty="0">
+                <a:solidFill>
+                  <a:schemeClr val="accent1"/>
+                </a:solidFill>
+              </a:rPr>
+              <a:t>-description&gt;</a:t>
             </a:r>
             <a:endParaRPr lang="en-BE" sz="1100" dirty="0">
               <a:solidFill>
@@ -5412,7 +5564,7 @@
         <p:spPr>
           <a:xfrm>
             <a:off x="3569110" y="3580982"/>
-            <a:ext cx="990977" cy="230832"/>
+            <a:ext cx="962123" cy="230832"/>
           </a:xfrm>
           <a:prstGeom prst="rect">
             <a:avLst/>
@@ -5431,7 +5583,23 @@
                   <a:schemeClr val="accent1"/>
                 </a:solidFill>
               </a:rPr>
-              <a:t>&lt;article #results&gt;</a:t>
+              <a:t>&lt;article .</a:t>
+            </a:r>
+            <a:r>
+              <a:rPr lang="fr-FR" sz="900" dirty="0" err="1">
+                <a:solidFill>
+                  <a:schemeClr val="accent1"/>
+                </a:solidFill>
+              </a:rPr>
+              <a:t>results</a:t>
+            </a:r>
+            <a:r>
+              <a:rPr lang="fr-FR" sz="900" dirty="0">
+                <a:solidFill>
+                  <a:schemeClr val="accent1"/>
+                </a:solidFill>
+              </a:rPr>
+              <a:t>&gt;</a:t>
             </a:r>
             <a:endParaRPr lang="en-BE" sz="900" dirty="0">
               <a:solidFill>
@@ -5456,7 +5624,7 @@
         <p:spPr>
           <a:xfrm>
             <a:off x="5448085" y="3577412"/>
-            <a:ext cx="1366080" cy="230832"/>
+            <a:ext cx="1010213" cy="230832"/>
           </a:xfrm>
           <a:prstGeom prst="rect">
             <a:avLst/>
@@ -5491,7 +5659,23 @@
                   <a:schemeClr val="accent1"/>
                 </a:solidFill>
               </a:rPr>
-              <a:t> #popular_results&gt;</a:t>
+              <a:t> .</a:t>
+            </a:r>
+            <a:r>
+              <a:rPr lang="fr-FR" sz="900" dirty="0" err="1">
+                <a:solidFill>
+                  <a:schemeClr val="accent1"/>
+                </a:solidFill>
+              </a:rPr>
+              <a:t>populars</a:t>
+            </a:r>
+            <a:r>
+              <a:rPr lang="fr-FR" sz="900" dirty="0">
+                <a:solidFill>
+                  <a:schemeClr val="accent1"/>
+                </a:solidFill>
+              </a:rPr>
+              <a:t>&gt;</a:t>
             </a:r>
             <a:endParaRPr lang="en-BE" sz="900" dirty="0">
               <a:solidFill>
@@ -5967,8 +6151,8 @@
         </p:nvSpPr>
         <p:spPr>
           <a:xfrm>
-            <a:off x="219240" y="4007715"/>
-            <a:ext cx="1386007" cy="1086635"/>
+            <a:off x="290994" y="4045825"/>
+            <a:ext cx="1314253" cy="1048525"/>
           </a:xfrm>
           <a:prstGeom prst="rect">
             <a:avLst/>
@@ -5976,7 +6160,7 @@
           <a:noFill/>
           <a:ln>
             <a:solidFill>
-              <a:schemeClr val="accent6"/>
+              <a:schemeClr val="accent4"/>
             </a:solidFill>
           </a:ln>
         </p:spPr>
@@ -6019,8 +6203,8 @@
         </p:nvSpPr>
         <p:spPr>
           <a:xfrm>
-            <a:off x="219240" y="5130016"/>
-            <a:ext cx="1386007" cy="1086635"/>
+            <a:off x="273987" y="5130016"/>
+            <a:ext cx="1331260" cy="1043621"/>
           </a:xfrm>
           <a:prstGeom prst="rect">
             <a:avLst/>
@@ -6028,7 +6212,7 @@
           <a:noFill/>
           <a:ln>
             <a:solidFill>
-              <a:schemeClr val="accent6"/>
+              <a:schemeClr val="accent4"/>
             </a:solidFill>
           </a:ln>
         </p:spPr>
@@ -6071,8 +6255,8 @@
         </p:nvSpPr>
         <p:spPr>
           <a:xfrm>
-            <a:off x="1629840" y="5131531"/>
-            <a:ext cx="1386007" cy="1086635"/>
+            <a:off x="1629840" y="5131532"/>
+            <a:ext cx="1386007" cy="1042106"/>
           </a:xfrm>
           <a:prstGeom prst="rect">
             <a:avLst/>
@@ -6080,7 +6264,7 @@
           <a:noFill/>
           <a:ln>
             <a:solidFill>
-              <a:schemeClr val="accent6"/>
+              <a:schemeClr val="accent4"/>
             </a:solidFill>
           </a:ln>
         </p:spPr>
@@ -6123,8 +6307,8 @@
         </p:nvSpPr>
         <p:spPr>
           <a:xfrm>
-            <a:off x="1631449" y="4007715"/>
-            <a:ext cx="1386007" cy="1086635"/>
+            <a:off x="1631449" y="4052244"/>
+            <a:ext cx="1386007" cy="1042106"/>
           </a:xfrm>
           <a:prstGeom prst="rect">
             <a:avLst/>
@@ -6132,7 +6316,7 @@
           <a:noFill/>
           <a:ln>
             <a:solidFill>
-              <a:schemeClr val="accent6"/>
+              <a:schemeClr val="accent4"/>
             </a:solidFill>
           </a:ln>
         </p:spPr>
@@ -6175,8 +6359,8 @@
         </p:nvSpPr>
         <p:spPr>
           <a:xfrm>
-            <a:off x="3048381" y="4007715"/>
-            <a:ext cx="1386007" cy="1086635"/>
+            <a:off x="3048381" y="4067342"/>
+            <a:ext cx="1326909" cy="1027008"/>
           </a:xfrm>
           <a:prstGeom prst="rect">
             <a:avLst/>
@@ -6184,7 +6368,7 @@
           <a:noFill/>
           <a:ln>
             <a:solidFill>
-              <a:schemeClr val="accent6"/>
+              <a:schemeClr val="accent4"/>
             </a:solidFill>
           </a:ln>
         </p:spPr>
@@ -6228,7 +6412,7 @@
         <p:spPr>
           <a:xfrm>
             <a:off x="3048381" y="5135190"/>
-            <a:ext cx="1386007" cy="1086635"/>
+            <a:ext cx="1326909" cy="1041685"/>
           </a:xfrm>
           <a:prstGeom prst="rect">
             <a:avLst/>
@@ -6236,7 +6420,7 @@
           <a:noFill/>
           <a:ln>
             <a:solidFill>
-              <a:schemeClr val="accent6"/>
+              <a:schemeClr val="accent4"/>
             </a:solidFill>
           </a:ln>
         </p:spPr>
@@ -7642,6 +7826,58 @@
                 <a:schemeClr val="accent6"/>
               </a:solidFill>
             </a:endParaRPr>
+          </a:p>
+        </p:txBody>
+      </p:sp>
+      <p:sp>
+        <p:nvSpPr>
+          <p:cNvPr id="4" name="Rectangle 3">
+            <a:extLst>
+              <a:ext uri="{FF2B5EF4-FFF2-40B4-BE49-F238E27FC236}">
+                <a16:creationId xmlns:a16="http://schemas.microsoft.com/office/drawing/2014/main" id="{1C2C0D0A-EB27-4048-9E16-E8117BA65326}"/>
+              </a:ext>
+            </a:extLst>
+          </p:cNvPr>
+          <p:cNvSpPr/>
+          <p:nvPr/>
+        </p:nvSpPr>
+        <p:spPr>
+          <a:xfrm>
+            <a:off x="201974" y="4015821"/>
+            <a:ext cx="4294911" cy="2201471"/>
+          </a:xfrm>
+          <a:prstGeom prst="rect">
+            <a:avLst/>
+          </a:prstGeom>
+          <a:noFill/>
+          <a:ln>
+            <a:solidFill>
+              <a:schemeClr val="accent6"/>
+            </a:solidFill>
+          </a:ln>
+        </p:spPr>
+        <p:style>
+          <a:lnRef idx="2">
+            <a:schemeClr val="accent1">
+              <a:shade val="50000"/>
+            </a:schemeClr>
+          </a:lnRef>
+          <a:fillRef idx="1">
+            <a:schemeClr val="accent1"/>
+          </a:fillRef>
+          <a:effectRef idx="0">
+            <a:schemeClr val="accent1"/>
+          </a:effectRef>
+          <a:fontRef idx="minor">
+            <a:schemeClr val="lt1"/>
+          </a:fontRef>
+        </p:style>
+        <p:txBody>
+          <a:bodyPr rtlCol="0" anchor="ctr"/>
+          <a:lstStyle/>
+          <a:p>
+            <a:pPr algn="ctr"/>
+            <a:endParaRPr lang="en-BE"/>
           </a:p>
         </p:txBody>
       </p:sp>

</xml_diff>